<commit_message>
Mise à jour du PowerPoint
</commit_message>
<xml_diff>
--- a/AVANT-PROJET/PrésentationAvantProjet.pptx
+++ b/AVANT-PROJET/PrésentationAvantProjet.pptx
@@ -5,17 +5,16 @@
     <p:sldMasterId id="2147483648" r:id="rId1"/>
   </p:sldMasterIdLst>
   <p:notesMasterIdLst>
-    <p:notesMasterId r:id="rId10"/>
+    <p:notesMasterId r:id="rId9"/>
   </p:notesMasterIdLst>
   <p:sldIdLst>
     <p:sldId id="256" r:id="rId2"/>
     <p:sldId id="257" r:id="rId3"/>
     <p:sldId id="258" r:id="rId4"/>
-    <p:sldId id="259" r:id="rId5"/>
-    <p:sldId id="260" r:id="rId6"/>
-    <p:sldId id="261" r:id="rId7"/>
-    <p:sldId id="264" r:id="rId8"/>
-    <p:sldId id="262" r:id="rId9"/>
+    <p:sldId id="261" r:id="rId5"/>
+    <p:sldId id="259" r:id="rId6"/>
+    <p:sldId id="260" r:id="rId7"/>
+    <p:sldId id="262" r:id="rId8"/>
   </p:sldIdLst>
   <p:sldSz cx="12192000" cy="6858000"/>
   <p:notesSz cx="6858000" cy="9144000"/>
@@ -1039,28 +1038,6 @@
         </a:p>
       </dgm:t>
     </dgm:pt>
-    <dgm:pt modelId="{9FEDCD68-38F6-A043-A977-CD3F0EECE56B}">
-      <dgm:prSet/>
-      <dgm:spPr/>
-      <dgm:t>
-        <a:bodyPr/>
-        <a:lstStyle/>
-        <a:p>
-          <a:r>
-            <a:rPr lang="fr-FR" dirty="0"/>
-            <a:t>V. Présentation DCU</a:t>
-          </a:r>
-        </a:p>
-      </dgm:t>
-    </dgm:pt>
-    <dgm:pt modelId="{5FA2D729-20B9-0342-927A-8B94C16F14C8}" type="parTrans" cxnId="{50E2A181-ACFB-4941-B5B7-0A09B77BF149}">
-      <dgm:prSet/>
-      <dgm:spPr/>
-    </dgm:pt>
-    <dgm:pt modelId="{8A587A74-DF9E-2F41-B392-D3BAABA06D59}" type="sibTrans" cxnId="{50E2A181-ACFB-4941-B5B7-0A09B77BF149}">
-      <dgm:prSet/>
-      <dgm:spPr/>
-    </dgm:pt>
     <dgm:pt modelId="{B414E46A-080F-2146-9FAD-C7241BAC1B9C}" type="pres">
       <dgm:prSet presAssocID="{B1F2FE45-7264-4A45-8A22-49DDA82E6C40}" presName="linear" presStyleCnt="0">
         <dgm:presLayoutVars>
@@ -1071,7 +1048,7 @@
       <dgm:spPr/>
     </dgm:pt>
     <dgm:pt modelId="{EA1A3945-51F7-354D-A4E6-42A7DB224CDE}" type="pres">
-      <dgm:prSet presAssocID="{E489D5AC-7B66-493C-A07B-DC228DB2E7F6}" presName="parentText" presStyleLbl="node1" presStyleIdx="0" presStyleCnt="5">
+      <dgm:prSet presAssocID="{E489D5AC-7B66-493C-A07B-DC228DB2E7F6}" presName="parentText" presStyleLbl="node1" presStyleIdx="0" presStyleCnt="4">
         <dgm:presLayoutVars>
           <dgm:chMax val="0"/>
           <dgm:bulletEnabled val="1"/>
@@ -1084,7 +1061,7 @@
       <dgm:spPr/>
     </dgm:pt>
     <dgm:pt modelId="{E33C7529-B317-CF4A-9A67-1178073A9479}" type="pres">
-      <dgm:prSet presAssocID="{0F7A9DBE-E7A8-408A-8F62-BA1D1B423D96}" presName="parentText" presStyleLbl="node1" presStyleIdx="1" presStyleCnt="5">
+      <dgm:prSet presAssocID="{0F7A9DBE-E7A8-408A-8F62-BA1D1B423D96}" presName="parentText" presStyleLbl="node1" presStyleIdx="1" presStyleCnt="4">
         <dgm:presLayoutVars>
           <dgm:chMax val="0"/>
           <dgm:bulletEnabled val="1"/>
@@ -1097,7 +1074,7 @@
       <dgm:spPr/>
     </dgm:pt>
     <dgm:pt modelId="{AF472B5C-0849-2C4D-B789-7C443E74A1A5}" type="pres">
-      <dgm:prSet presAssocID="{37C79047-7960-4F14-8429-1A6351003642}" presName="parentText" presStyleLbl="node1" presStyleIdx="2" presStyleCnt="5">
+      <dgm:prSet presAssocID="{37C79047-7960-4F14-8429-1A6351003642}" presName="parentText" presStyleLbl="node1" presStyleIdx="2" presStyleCnt="4">
         <dgm:presLayoutVars>
           <dgm:chMax val="0"/>
           <dgm:bulletEnabled val="1"/>
@@ -1110,20 +1087,7 @@
       <dgm:spPr/>
     </dgm:pt>
     <dgm:pt modelId="{584D5366-2E09-DD4C-B3D9-D2FFBBB4D0C4}" type="pres">
-      <dgm:prSet presAssocID="{15C36091-1AB2-452F-8947-A1219372CAF1}" presName="parentText" presStyleLbl="node1" presStyleIdx="3" presStyleCnt="5">
-        <dgm:presLayoutVars>
-          <dgm:chMax val="0"/>
-          <dgm:bulletEnabled val="1"/>
-        </dgm:presLayoutVars>
-      </dgm:prSet>
-      <dgm:spPr/>
-    </dgm:pt>
-    <dgm:pt modelId="{C6CE6919-C0ED-804B-A875-9B95478093C7}" type="pres">
-      <dgm:prSet presAssocID="{1366DDFD-37AC-4025-85B1-0F2144E40DC0}" presName="spacer" presStyleCnt="0"/>
-      <dgm:spPr/>
-    </dgm:pt>
-    <dgm:pt modelId="{02EE7E10-53F9-ED4B-AA82-06FA500DD9E3}" type="pres">
-      <dgm:prSet presAssocID="{9FEDCD68-38F6-A043-A977-CD3F0EECE56B}" presName="parentText" presStyleLbl="node1" presStyleIdx="4" presStyleCnt="5">
+      <dgm:prSet presAssocID="{15C36091-1AB2-452F-8947-A1219372CAF1}" presName="parentText" presStyleLbl="node1" presStyleIdx="3" presStyleCnt="4">
         <dgm:presLayoutVars>
           <dgm:chMax val="0"/>
           <dgm:bulletEnabled val="1"/>
@@ -1136,11 +1100,9 @@
     <dgm:cxn modelId="{2B0EBC0E-05CD-4135-BBF0-1DAA358781FF}" srcId="{B1F2FE45-7264-4A45-8A22-49DDA82E6C40}" destId="{37C79047-7960-4F14-8429-1A6351003642}" srcOrd="2" destOrd="0" parTransId="{9FA10A9E-A6E0-487F-B082-6ED8774C88C6}" sibTransId="{61DCD53D-B298-4928-98A0-DA93E8DD4F90}"/>
     <dgm:cxn modelId="{42FEDC4A-05C8-4903-A552-75DC472CF087}" srcId="{B1F2FE45-7264-4A45-8A22-49DDA82E6C40}" destId="{0F7A9DBE-E7A8-408A-8F62-BA1D1B423D96}" srcOrd="1" destOrd="0" parTransId="{171F5BF0-9958-4879-8FD5-66F402E8C399}" sibTransId="{70CA4F6A-E727-4733-A468-F9E322EBFEA6}"/>
     <dgm:cxn modelId="{DC543C7A-23DA-4DB7-B8BF-5CAE7F1E3503}" srcId="{B1F2FE45-7264-4A45-8A22-49DDA82E6C40}" destId="{15C36091-1AB2-452F-8947-A1219372CAF1}" srcOrd="3" destOrd="0" parTransId="{66B7747F-1588-4086-8009-9D56CD175D4E}" sibTransId="{1366DDFD-37AC-4025-85B1-0F2144E40DC0}"/>
-    <dgm:cxn modelId="{50E2A181-ACFB-4941-B5B7-0A09B77BF149}" srcId="{B1F2FE45-7264-4A45-8A22-49DDA82E6C40}" destId="{9FEDCD68-38F6-A043-A977-CD3F0EECE56B}" srcOrd="4" destOrd="0" parTransId="{5FA2D729-20B9-0342-927A-8B94C16F14C8}" sibTransId="{8A587A74-DF9E-2F41-B392-D3BAABA06D59}"/>
     <dgm:cxn modelId="{A170478E-84C2-2347-B68A-50C2BB2F1DDE}" type="presOf" srcId="{37C79047-7960-4F14-8429-1A6351003642}" destId="{AF472B5C-0849-2C4D-B789-7C443E74A1A5}" srcOrd="0" destOrd="0" presId="urn:microsoft.com/office/officeart/2005/8/layout/vList2"/>
     <dgm:cxn modelId="{59284D9B-9A49-44C4-9294-DB4D66A0BD66}" srcId="{B1F2FE45-7264-4A45-8A22-49DDA82E6C40}" destId="{E489D5AC-7B66-493C-A07B-DC228DB2E7F6}" srcOrd="0" destOrd="0" parTransId="{0033A369-CBD6-45C2-8187-A8420BFE557F}" sibTransId="{B7A58403-F91D-474C-B1ED-A5FC073CE814}"/>
     <dgm:cxn modelId="{BCD031CF-055F-5B41-A254-6EF1C59EBBC0}" type="presOf" srcId="{15C36091-1AB2-452F-8947-A1219372CAF1}" destId="{584D5366-2E09-DD4C-B3D9-D2FFBBB4D0C4}" srcOrd="0" destOrd="0" presId="urn:microsoft.com/office/officeart/2005/8/layout/vList2"/>
-    <dgm:cxn modelId="{82972CE4-3858-C745-B1A5-DA5AAADCA8B2}" type="presOf" srcId="{9FEDCD68-38F6-A043-A977-CD3F0EECE56B}" destId="{02EE7E10-53F9-ED4B-AA82-06FA500DD9E3}" srcOrd="0" destOrd="0" presId="urn:microsoft.com/office/officeart/2005/8/layout/vList2"/>
     <dgm:cxn modelId="{3BE28AE6-6C2C-BD4B-B981-19D2E84678AA}" type="presOf" srcId="{E489D5AC-7B66-493C-A07B-DC228DB2E7F6}" destId="{EA1A3945-51F7-354D-A4E6-42A7DB224CDE}" srcOrd="0" destOrd="0" presId="urn:microsoft.com/office/officeart/2005/8/layout/vList2"/>
     <dgm:cxn modelId="{85AECFF6-4E2D-D247-B91C-6E70164B6EF6}" type="presOf" srcId="{0F7A9DBE-E7A8-408A-8F62-BA1D1B423D96}" destId="{E33C7529-B317-CF4A-9A67-1178073A9479}" srcOrd="0" destOrd="0" presId="urn:microsoft.com/office/officeart/2005/8/layout/vList2"/>
     <dgm:cxn modelId="{9D1527F7-32D6-DE49-9DD0-245071F7939B}" type="presOf" srcId="{B1F2FE45-7264-4A45-8A22-49DDA82E6C40}" destId="{B414E46A-080F-2146-9FAD-C7241BAC1B9C}" srcOrd="0" destOrd="0" presId="urn:microsoft.com/office/officeart/2005/8/layout/vList2"/>
@@ -1151,8 +1113,6 @@
     <dgm:cxn modelId="{7F4D1808-55B4-8646-BF3C-2FEDA9A37739}" type="presParOf" srcId="{B414E46A-080F-2146-9FAD-C7241BAC1B9C}" destId="{AF472B5C-0849-2C4D-B789-7C443E74A1A5}" srcOrd="4" destOrd="0" presId="urn:microsoft.com/office/officeart/2005/8/layout/vList2"/>
     <dgm:cxn modelId="{D8FCCA6A-5156-8849-BDE5-FB923363245B}" type="presParOf" srcId="{B414E46A-080F-2146-9FAD-C7241BAC1B9C}" destId="{0E956D69-E24A-A74E-B96F-533D6503BDA1}" srcOrd="5" destOrd="0" presId="urn:microsoft.com/office/officeart/2005/8/layout/vList2"/>
     <dgm:cxn modelId="{A2854C4C-9076-0547-BF72-4C1074AF7C62}" type="presParOf" srcId="{B414E46A-080F-2146-9FAD-C7241BAC1B9C}" destId="{584D5366-2E09-DD4C-B3D9-D2FFBBB4D0C4}" srcOrd="6" destOrd="0" presId="urn:microsoft.com/office/officeart/2005/8/layout/vList2"/>
-    <dgm:cxn modelId="{E6B3B239-E062-4B4A-AE68-6AEF2E24D8AA}" type="presParOf" srcId="{B414E46A-080F-2146-9FAD-C7241BAC1B9C}" destId="{C6CE6919-C0ED-804B-A875-9B95478093C7}" srcOrd="7" destOrd="0" presId="urn:microsoft.com/office/officeart/2005/8/layout/vList2"/>
-    <dgm:cxn modelId="{3F801D62-9FDB-E243-B287-52871B7581B0}" type="presParOf" srcId="{B414E46A-080F-2146-9FAD-C7241BAC1B9C}" destId="{02EE7E10-53F9-ED4B-AA82-06FA500DD9E3}" srcOrd="8" destOrd="0" presId="urn:microsoft.com/office/officeart/2005/8/layout/vList2"/>
   </dgm:cxnLst>
   <dgm:bg/>
   <dgm:whole/>
@@ -1179,8 +1139,8 @@
       </dsp:nvSpPr>
       <dsp:spPr>
         <a:xfrm>
-          <a:off x="0" y="25748"/>
-          <a:ext cx="10515600" cy="786240"/>
+          <a:off x="0" y="37268"/>
+          <a:ext cx="10515600" cy="982800"/>
         </a:xfrm>
         <a:prstGeom prst="roundRect">
           <a:avLst/>
@@ -1222,12 +1182,12 @@
         </a:fontRef>
       </dsp:style>
       <dsp:txBody>
-        <a:bodyPr spcFirstLastPara="0" vert="horz" wrap="square" lIns="121920" tIns="121920" rIns="121920" bIns="121920" numCol="1" spcCol="1270" anchor="ctr" anchorCtr="0">
+        <a:bodyPr spcFirstLastPara="0" vert="horz" wrap="square" lIns="152400" tIns="152400" rIns="152400" bIns="152400" numCol="1" spcCol="1270" anchor="ctr" anchorCtr="0">
           <a:noAutofit/>
         </a:bodyPr>
         <a:lstStyle/>
         <a:p>
-          <a:pPr marL="0" lvl="0" indent="0" algn="l" defTabSz="1422400">
+          <a:pPr marL="0" lvl="0" indent="0" algn="l" defTabSz="1778000">
             <a:lnSpc>
               <a:spcPct val="90000"/>
             </a:lnSpc>
@@ -1240,23 +1200,23 @@
             <a:buNone/>
           </a:pPr>
           <a:r>
-            <a:rPr lang="fr-FR" sz="3200" kern="1200" dirty="0"/>
+            <a:rPr lang="fr-FR" sz="4000" kern="1200" dirty="0"/>
             <a:t>I. C’est quoi </a:t>
           </a:r>
           <a:r>
-            <a:rPr lang="fr-FR" sz="3200" kern="1200" dirty="0" err="1"/>
+            <a:rPr lang="fr-FR" sz="4000" kern="1200" dirty="0" err="1"/>
             <a:t>NavConnect</a:t>
           </a:r>
           <a:r>
-            <a:rPr lang="fr-FR" sz="3200" kern="1200" dirty="0"/>
+            <a:rPr lang="fr-FR" sz="4000" kern="1200" dirty="0"/>
             <a:t> ?</a:t>
           </a:r>
-          <a:endParaRPr lang="en-US" sz="3200" kern="1200" dirty="0"/>
+          <a:endParaRPr lang="en-US" sz="4000" kern="1200" dirty="0"/>
         </a:p>
       </dsp:txBody>
       <dsp:txXfrm>
-        <a:off x="38381" y="64129"/>
-        <a:ext cx="10438838" cy="709478"/>
+        <a:off x="47976" y="85244"/>
+        <a:ext cx="10419648" cy="886848"/>
       </dsp:txXfrm>
     </dsp:sp>
     <dsp:sp modelId="{E33C7529-B317-CF4A-9A67-1178073A9479}">
@@ -1266,8 +1226,8 @@
       </dsp:nvSpPr>
       <dsp:spPr>
         <a:xfrm>
-          <a:off x="0" y="904148"/>
-          <a:ext cx="10515600" cy="786240"/>
+          <a:off x="0" y="1135269"/>
+          <a:ext cx="10515600" cy="982800"/>
         </a:xfrm>
         <a:prstGeom prst="roundRect">
           <a:avLst/>
@@ -1309,12 +1269,12 @@
         </a:fontRef>
       </dsp:style>
       <dsp:txBody>
-        <a:bodyPr spcFirstLastPara="0" vert="horz" wrap="square" lIns="121920" tIns="121920" rIns="121920" bIns="121920" numCol="1" spcCol="1270" anchor="ctr" anchorCtr="0">
+        <a:bodyPr spcFirstLastPara="0" vert="horz" wrap="square" lIns="152400" tIns="152400" rIns="152400" bIns="152400" numCol="1" spcCol="1270" anchor="ctr" anchorCtr="0">
           <a:noAutofit/>
         </a:bodyPr>
         <a:lstStyle/>
         <a:p>
-          <a:pPr marL="0" lvl="0" indent="0" algn="l" defTabSz="1422400">
+          <a:pPr marL="0" lvl="0" indent="0" algn="l" defTabSz="1778000">
             <a:lnSpc>
               <a:spcPct val="90000"/>
             </a:lnSpc>
@@ -1327,15 +1287,15 @@
             <a:buNone/>
           </a:pPr>
           <a:r>
-            <a:rPr lang="fr-FR" sz="3200" kern="1200" dirty="0"/>
+            <a:rPr lang="fr-FR" sz="4000" kern="1200" dirty="0"/>
             <a:t>II. Présentation du SWOT</a:t>
           </a:r>
-          <a:endParaRPr lang="en-US" sz="3200" kern="1200" dirty="0"/>
+          <a:endParaRPr lang="en-US" sz="4000" kern="1200" dirty="0"/>
         </a:p>
       </dsp:txBody>
       <dsp:txXfrm>
-        <a:off x="38381" y="942529"/>
-        <a:ext cx="10438838" cy="709478"/>
+        <a:off x="47976" y="1183245"/>
+        <a:ext cx="10419648" cy="886848"/>
       </dsp:txXfrm>
     </dsp:sp>
     <dsp:sp modelId="{AF472B5C-0849-2C4D-B789-7C443E74A1A5}">
@@ -1345,8 +1305,8 @@
       </dsp:nvSpPr>
       <dsp:spPr>
         <a:xfrm>
-          <a:off x="0" y="1782549"/>
-          <a:ext cx="10515600" cy="786240"/>
+          <a:off x="0" y="2233269"/>
+          <a:ext cx="10515600" cy="982800"/>
         </a:xfrm>
         <a:prstGeom prst="roundRect">
           <a:avLst/>
@@ -1388,12 +1348,12 @@
         </a:fontRef>
       </dsp:style>
       <dsp:txBody>
-        <a:bodyPr spcFirstLastPara="0" vert="horz" wrap="square" lIns="121920" tIns="121920" rIns="121920" bIns="121920" numCol="1" spcCol="1270" anchor="ctr" anchorCtr="0">
+        <a:bodyPr spcFirstLastPara="0" vert="horz" wrap="square" lIns="152400" tIns="152400" rIns="152400" bIns="152400" numCol="1" spcCol="1270" anchor="ctr" anchorCtr="0">
           <a:noAutofit/>
         </a:bodyPr>
         <a:lstStyle/>
         <a:p>
-          <a:pPr marL="0" lvl="0" indent="0" algn="l" defTabSz="1422400">
+          <a:pPr marL="0" lvl="0" indent="0" algn="l" defTabSz="1778000">
             <a:lnSpc>
               <a:spcPct val="90000"/>
             </a:lnSpc>
@@ -1406,15 +1366,15 @@
             <a:buNone/>
           </a:pPr>
           <a:r>
-            <a:rPr lang="fr-FR" sz="3200" kern="1200" dirty="0"/>
+            <a:rPr lang="fr-FR" sz="4000" kern="1200" dirty="0"/>
             <a:t>III. Présentation du SMART</a:t>
           </a:r>
-          <a:endParaRPr lang="en-US" sz="3200" kern="1200" dirty="0"/>
+          <a:endParaRPr lang="en-US" sz="4000" kern="1200" dirty="0"/>
         </a:p>
       </dsp:txBody>
       <dsp:txXfrm>
-        <a:off x="38381" y="1820930"/>
-        <a:ext cx="10438838" cy="709478"/>
+        <a:off x="47976" y="2281245"/>
+        <a:ext cx="10419648" cy="886848"/>
       </dsp:txXfrm>
     </dsp:sp>
     <dsp:sp modelId="{584D5366-2E09-DD4C-B3D9-D2FFBBB4D0C4}">
@@ -1424,8 +1384,8 @@
       </dsp:nvSpPr>
       <dsp:spPr>
         <a:xfrm>
-          <a:off x="0" y="2660949"/>
-          <a:ext cx="10515600" cy="786240"/>
+          <a:off x="0" y="3331269"/>
+          <a:ext cx="10515600" cy="982800"/>
         </a:xfrm>
         <a:prstGeom prst="roundRect">
           <a:avLst/>
@@ -1467,12 +1427,12 @@
         </a:fontRef>
       </dsp:style>
       <dsp:txBody>
-        <a:bodyPr spcFirstLastPara="0" vert="horz" wrap="square" lIns="121920" tIns="121920" rIns="121920" bIns="121920" numCol="1" spcCol="1270" anchor="ctr" anchorCtr="0">
+        <a:bodyPr spcFirstLastPara="0" vert="horz" wrap="square" lIns="152400" tIns="152400" rIns="152400" bIns="152400" numCol="1" spcCol="1270" anchor="ctr" anchorCtr="0">
           <a:noAutofit/>
         </a:bodyPr>
         <a:lstStyle/>
         <a:p>
-          <a:pPr marL="0" lvl="0" indent="0" algn="l" defTabSz="1422400">
+          <a:pPr marL="0" lvl="0" indent="0" algn="l" defTabSz="1778000">
             <a:lnSpc>
               <a:spcPct val="90000"/>
             </a:lnSpc>
@@ -1485,93 +1445,15 @@
             <a:buNone/>
           </a:pPr>
           <a:r>
-            <a:rPr lang="fr-FR" sz="3200" kern="1200" dirty="0"/>
+            <a:rPr lang="fr-FR" sz="4000" kern="1200" dirty="0"/>
             <a:t>IV. Présentation du QUINTILIEN</a:t>
           </a:r>
-          <a:endParaRPr lang="en-US" sz="3200" kern="1200" dirty="0"/>
+          <a:endParaRPr lang="en-US" sz="4000" kern="1200" dirty="0"/>
         </a:p>
       </dsp:txBody>
       <dsp:txXfrm>
-        <a:off x="38381" y="2699330"/>
-        <a:ext cx="10438838" cy="709478"/>
-      </dsp:txXfrm>
-    </dsp:sp>
-    <dsp:sp modelId="{02EE7E10-53F9-ED4B-AA82-06FA500DD9E3}">
-      <dsp:nvSpPr>
-        <dsp:cNvPr id="0" name=""/>
-        <dsp:cNvSpPr/>
-      </dsp:nvSpPr>
-      <dsp:spPr>
-        <a:xfrm>
-          <a:off x="0" y="3539349"/>
-          <a:ext cx="10515600" cy="786240"/>
-        </a:xfrm>
-        <a:prstGeom prst="roundRect">
-          <a:avLst/>
-        </a:prstGeom>
-        <a:solidFill>
-          <a:schemeClr val="accent1">
-            <a:hueOff val="0"/>
-            <a:satOff val="0"/>
-            <a:lumOff val="0"/>
-            <a:alphaOff val="0"/>
-          </a:schemeClr>
-        </a:solidFill>
-        <a:ln w="19050" cap="flat" cmpd="sng" algn="ctr">
-          <a:solidFill>
-            <a:schemeClr val="lt1">
-              <a:hueOff val="0"/>
-              <a:satOff val="0"/>
-              <a:lumOff val="0"/>
-              <a:alphaOff val="0"/>
-            </a:schemeClr>
-          </a:solidFill>
-          <a:prstDash val="solid"/>
-          <a:miter lim="800000"/>
-        </a:ln>
-        <a:effectLst/>
-      </dsp:spPr>
-      <dsp:style>
-        <a:lnRef idx="2">
-          <a:scrgbClr r="0" g="0" b="0"/>
-        </a:lnRef>
-        <a:fillRef idx="1">
-          <a:scrgbClr r="0" g="0" b="0"/>
-        </a:fillRef>
-        <a:effectRef idx="0">
-          <a:scrgbClr r="0" g="0" b="0"/>
-        </a:effectRef>
-        <a:fontRef idx="minor">
-          <a:schemeClr val="lt1"/>
-        </a:fontRef>
-      </dsp:style>
-      <dsp:txBody>
-        <a:bodyPr spcFirstLastPara="0" vert="horz" wrap="square" lIns="121920" tIns="121920" rIns="121920" bIns="121920" numCol="1" spcCol="1270" anchor="ctr" anchorCtr="0">
-          <a:noAutofit/>
-        </a:bodyPr>
-        <a:lstStyle/>
-        <a:p>
-          <a:pPr marL="0" lvl="0" indent="0" algn="l" defTabSz="1422400">
-            <a:lnSpc>
-              <a:spcPct val="90000"/>
-            </a:lnSpc>
-            <a:spcBef>
-              <a:spcPct val="0"/>
-            </a:spcBef>
-            <a:spcAft>
-              <a:spcPct val="35000"/>
-            </a:spcAft>
-            <a:buNone/>
-          </a:pPr>
-          <a:r>
-            <a:rPr lang="fr-FR" sz="3200" kern="1200" dirty="0"/>
-            <a:t>V. Présentation DCU</a:t>
-          </a:r>
-        </a:p>
-      </dsp:txBody>
-      <dsp:txXfrm>
-        <a:off x="38381" y="3577730"/>
-        <a:ext cx="10438838" cy="709478"/>
+        <a:off x="47976" y="3379245"/>
+        <a:ext cx="10419648" cy="886848"/>
       </dsp:txXfrm>
     </dsp:sp>
   </dsp:spTree>
@@ -6882,6 +6764,53 @@
           </a:p>
         </p:txBody>
       </p:sp>
+      <p:pic>
+        <p:nvPicPr>
+          <p:cNvPr id="3074" name="Picture 2">
+            <a:extLst>
+              <a:ext uri="{FF2B5EF4-FFF2-40B4-BE49-F238E27FC236}">
+                <a16:creationId xmlns:a16="http://schemas.microsoft.com/office/drawing/2014/main" id="{0D9D92BF-8ABC-148B-3137-594BEE72A9C8}"/>
+              </a:ext>
+            </a:extLst>
+          </p:cNvPr>
+          <p:cNvPicPr>
+            <a:picLocks noChangeAspect="1" noChangeArrowheads="1"/>
+          </p:cNvPicPr>
+          <p:nvPr/>
+        </p:nvPicPr>
+        <p:blipFill>
+          <a:blip r:embed="rId2">
+            <a:extLst>
+              <a:ext uri="{28A0092B-C50C-407E-A947-70E740481C1C}">
+                <a14:useLocalDpi xmlns:a14="http://schemas.microsoft.com/office/drawing/2010/main" val="0"/>
+              </a:ext>
+            </a:extLst>
+          </a:blip>
+          <a:srcRect/>
+          <a:stretch>
+            <a:fillRect/>
+          </a:stretch>
+        </p:blipFill>
+        <p:spPr bwMode="auto">
+          <a:xfrm>
+            <a:off x="818515" y="752711"/>
+            <a:ext cx="2622113" cy="1178408"/>
+          </a:xfrm>
+          <a:prstGeom prst="rect">
+            <a:avLst/>
+          </a:prstGeom>
+          <a:noFill/>
+          <a:extLst>
+            <a:ext uri="{909E8E84-426E-40DD-AFC4-6F175D3DCCD1}">
+              <a14:hiddenFill xmlns:a14="http://schemas.microsoft.com/office/drawing/2010/main">
+                <a:solidFill>
+                  <a:srgbClr val="FFFFFF"/>
+                </a:solidFill>
+              </a14:hiddenFill>
+            </a:ext>
+          </a:extLst>
+        </p:spPr>
+      </p:pic>
     </p:spTree>
     <p:extLst>
       <p:ext uri="{BB962C8B-B14F-4D97-AF65-F5344CB8AC3E}">
@@ -6957,7 +6886,7 @@
             <p:ph idx="1"/>
             <p:extLst>
               <p:ext uri="{D42A27DB-BD31-4B8C-83A1-F6EECF244321}">
-                <p14:modId xmlns:p14="http://schemas.microsoft.com/office/powerpoint/2010/main" val="3085582419"/>
+                <p14:modId xmlns:p14="http://schemas.microsoft.com/office/powerpoint/2010/main" val="2948365228"/>
               </p:ext>
             </p:extLst>
           </p:nvPr>
@@ -7704,6 +7633,19 @@
           </a:bodyPr>
           <a:lstStyle/>
           <a:p>
+            <a:pPr marL="0" indent="0">
+              <a:buNone/>
+            </a:pPr>
+            <a:r>
+              <a:rPr lang="en-US" sz="2000" dirty="0" err="1">
+                <a:solidFill>
+                  <a:schemeClr val="tx1">
+                    <a:alpha val="80000"/>
+                  </a:schemeClr>
+                </a:solidFill>
+              </a:rPr>
+              <a:t>NavConnect</a:t>
+            </a:r>
             <a:r>
               <a:rPr lang="en-US" sz="2000" dirty="0">
                 <a:solidFill>
@@ -7712,7 +7654,47 @@
                   </a:schemeClr>
                 </a:solidFill>
               </a:rPr>
-              <a:t>Une application web </a:t>
+              <a:t> </a:t>
+            </a:r>
+            <a:r>
+              <a:rPr lang="en-US" sz="2000" dirty="0" err="1">
+                <a:solidFill>
+                  <a:schemeClr val="tx1">
+                    <a:alpha val="80000"/>
+                  </a:schemeClr>
+                </a:solidFill>
+              </a:rPr>
+              <a:t>est</a:t>
+            </a:r>
+            <a:r>
+              <a:rPr lang="en-US" sz="2000" dirty="0">
+                <a:solidFill>
+                  <a:schemeClr val="tx1">
+                    <a:alpha val="80000"/>
+                  </a:schemeClr>
+                </a:solidFill>
+              </a:rPr>
+              <a:t> </a:t>
+            </a:r>
+            <a:r>
+              <a:rPr lang="en-US" sz="2000" dirty="0" err="1">
+                <a:solidFill>
+                  <a:schemeClr val="tx1">
+                    <a:alpha val="80000"/>
+                  </a:schemeClr>
+                </a:solidFill>
+              </a:rPr>
+              <a:t>une</a:t>
+            </a:r>
+            <a:r>
+              <a:rPr lang="en-US" sz="2000" dirty="0">
+                <a:solidFill>
+                  <a:schemeClr val="tx1">
+                    <a:alpha val="80000"/>
+                  </a:schemeClr>
+                </a:solidFill>
+              </a:rPr>
+              <a:t> application web </a:t>
             </a:r>
             <a:r>
               <a:rPr lang="en-US" sz="2000" dirty="0" err="1">
@@ -8056,6 +8038,14 @@
 <file path=ppt/slides/slide4.xml><?xml version="1.0" encoding="utf-8"?>
 <p:sld xmlns:a="http://schemas.openxmlformats.org/drawingml/2006/main" xmlns:r="http://schemas.openxmlformats.org/officeDocument/2006/relationships" xmlns:p="http://schemas.openxmlformats.org/presentationml/2006/main">
   <p:cSld>
+    <p:bg>
+      <p:bgPr>
+        <a:solidFill>
+          <a:schemeClr val="bg1"/>
+        </a:solidFill>
+        <a:effectLst/>
+      </p:bgPr>
+    </p:bg>
     <p:spTree>
       <p:nvGrpSpPr>
         <p:cNvPr id="1" name=""/>
@@ -8072,6 +8062,351 @@
       </p:grpSpPr>
       <p:sp>
         <p:nvSpPr>
+          <p:cNvPr id="16" name="Flowchart: Document 15">
+            <a:extLst>
+              <a:ext uri="{FF2B5EF4-FFF2-40B4-BE49-F238E27FC236}">
+                <a16:creationId xmlns:a16="http://schemas.microsoft.com/office/drawing/2014/main" id="{D12DDE76-C203-4047-9998-63900085B5E8}"/>
+              </a:ext>
+              <a:ext uri="{C183D7F6-B498-43B3-948B-1728B52AA6E4}">
+                <adec:decorative xmlns:adec="http://schemas.microsoft.com/office/drawing/2017/decorative" val="1"/>
+              </a:ext>
+            </a:extLst>
+          </p:cNvPr>
+          <p:cNvSpPr>
+            <a:spLocks noGrp="1" noRot="1" noChangeAspect="1" noMove="1" noResize="1" noEditPoints="1" noAdjustHandles="1" noChangeArrowheads="1" noChangeShapeType="1" noTextEdit="1"/>
+          </p:cNvSpPr>
+          <p:nvPr>
+            <p:extLst>
+              <p:ext uri="{386F3935-93C4-4BCD-93E2-E3B085C9AB24}">
+                <p16:designElem xmlns:p16="http://schemas.microsoft.com/office/powerpoint/2015/main" val="1"/>
+              </p:ext>
+            </p:extLst>
+          </p:nvPr>
+        </p:nvSpPr>
+        <p:spPr>
+          <a:xfrm>
+            <a:off x="638175" y="0"/>
+            <a:ext cx="3248025" cy="3400426"/>
+          </a:xfrm>
+          <a:prstGeom prst="flowChartDocument">
+            <a:avLst/>
+          </a:prstGeom>
+          <a:solidFill>
+            <a:schemeClr val="accent1"/>
+          </a:solidFill>
+          <a:ln>
+            <a:noFill/>
+          </a:ln>
+        </p:spPr>
+        <p:style>
+          <a:lnRef idx="2">
+            <a:schemeClr val="accent1">
+              <a:shade val="50000"/>
+            </a:schemeClr>
+          </a:lnRef>
+          <a:fillRef idx="1">
+            <a:schemeClr val="accent1"/>
+          </a:fillRef>
+          <a:effectRef idx="0">
+            <a:schemeClr val="accent1"/>
+          </a:effectRef>
+          <a:fontRef idx="minor">
+            <a:schemeClr val="lt1"/>
+          </a:fontRef>
+        </p:style>
+        <p:txBody>
+          <a:bodyPr rtlCol="0" anchor="ctr"/>
+          <a:lstStyle/>
+          <a:p>
+            <a:pPr algn="ctr"/>
+            <a:endParaRPr lang="en-US"/>
+          </a:p>
+        </p:txBody>
+      </p:sp>
+      <p:sp>
+        <p:nvSpPr>
+          <p:cNvPr id="2" name="Titre 1">
+            <a:extLst>
+              <a:ext uri="{FF2B5EF4-FFF2-40B4-BE49-F238E27FC236}">
+                <a16:creationId xmlns:a16="http://schemas.microsoft.com/office/drawing/2014/main" id="{2AEF988E-03ED-203D-A2B1-E6D0277BCFED}"/>
+              </a:ext>
+            </a:extLst>
+          </p:cNvPr>
+          <p:cNvSpPr>
+            <a:spLocks noGrp="1"/>
+          </p:cNvSpPr>
+          <p:nvPr>
+            <p:ph type="title"/>
+          </p:nvPr>
+        </p:nvSpPr>
+        <p:spPr>
+          <a:xfrm>
+            <a:off x="838200" y="171162"/>
+            <a:ext cx="2840182" cy="2371148"/>
+          </a:xfrm>
+        </p:spPr>
+        <p:txBody>
+          <a:bodyPr vert="horz" lIns="91440" tIns="45720" rIns="91440" bIns="45720" rtlCol="0" anchor="ctr">
+            <a:normAutofit/>
+          </a:bodyPr>
+          <a:lstStyle/>
+          <a:p>
+            <a:r>
+              <a:rPr lang="en-US" sz="3200" dirty="0">
+                <a:solidFill>
+                  <a:srgbClr val="FFFFFF"/>
+                </a:solidFill>
+              </a:rPr>
+              <a:t>II</a:t>
+            </a:r>
+            <a:r>
+              <a:rPr lang="en-US" sz="3200" kern="1200" dirty="0">
+                <a:solidFill>
+                  <a:srgbClr val="FFFFFF"/>
+                </a:solidFill>
+                <a:latin typeface="+mj-lt"/>
+                <a:ea typeface="+mj-ea"/>
+                <a:cs typeface="+mj-cs"/>
+              </a:rPr>
+              <a:t>. </a:t>
+            </a:r>
+            <a:r>
+              <a:rPr lang="en-US" sz="3200" kern="1200" dirty="0" err="1">
+                <a:solidFill>
+                  <a:srgbClr val="FFFFFF"/>
+                </a:solidFill>
+                <a:latin typeface="+mj-lt"/>
+                <a:ea typeface="+mj-ea"/>
+                <a:cs typeface="+mj-cs"/>
+              </a:rPr>
+              <a:t>Présentation</a:t>
+            </a:r>
+            <a:r>
+              <a:rPr lang="en-US" sz="3200" kern="1200" dirty="0">
+                <a:solidFill>
+                  <a:srgbClr val="FFFFFF"/>
+                </a:solidFill>
+                <a:latin typeface="+mj-lt"/>
+                <a:ea typeface="+mj-ea"/>
+                <a:cs typeface="+mj-cs"/>
+              </a:rPr>
+              <a:t> du QUINTILIEN</a:t>
+            </a:r>
+          </a:p>
+        </p:txBody>
+      </p:sp>
+      <p:pic>
+        <p:nvPicPr>
+          <p:cNvPr id="11" name="Espace réservé du contenu 10" descr="Une image contenant texte, cercle, Police, capture d’écran&#10;&#10;Description générée automatiquement">
+            <a:extLst>
+              <a:ext uri="{FF2B5EF4-FFF2-40B4-BE49-F238E27FC236}">
+                <a16:creationId xmlns:a16="http://schemas.microsoft.com/office/drawing/2014/main" id="{602121B6-C221-9E27-EB1D-7ED7C4988872}"/>
+              </a:ext>
+            </a:extLst>
+          </p:cNvPr>
+          <p:cNvPicPr>
+            <a:picLocks noGrp="1" noChangeAspect="1"/>
+          </p:cNvPicPr>
+          <p:nvPr>
+            <p:ph idx="1"/>
+          </p:nvPr>
+        </p:nvPicPr>
+        <p:blipFill>
+          <a:blip r:embed="rId2"/>
+          <a:stretch>
+            <a:fillRect/>
+          </a:stretch>
+        </p:blipFill>
+        <p:spPr>
+          <a:xfrm>
+            <a:off x="4372856" y="136525"/>
+            <a:ext cx="6980944" cy="6255138"/>
+          </a:xfrm>
+          <a:prstGeom prst="rect">
+            <a:avLst/>
+          </a:prstGeom>
+        </p:spPr>
+      </p:pic>
+      <p:sp>
+        <p:nvSpPr>
+          <p:cNvPr id="5" name="Espace réservé du pied de page 4">
+            <a:extLst>
+              <a:ext uri="{FF2B5EF4-FFF2-40B4-BE49-F238E27FC236}">
+                <a16:creationId xmlns:a16="http://schemas.microsoft.com/office/drawing/2014/main" id="{2D908748-EAFA-6705-763E-67505F094D79}"/>
+              </a:ext>
+            </a:extLst>
+          </p:cNvPr>
+          <p:cNvSpPr>
+            <a:spLocks noGrp="1"/>
+          </p:cNvSpPr>
+          <p:nvPr>
+            <p:ph type="ftr" sz="quarter" idx="11"/>
+          </p:nvPr>
+        </p:nvSpPr>
+        <p:spPr>
+          <a:xfrm>
+            <a:off x="838200" y="6356350"/>
+            <a:ext cx="5960951" cy="365125"/>
+          </a:xfrm>
+          <a:noFill/>
+        </p:spPr>
+        <p:txBody>
+          <a:bodyPr vert="horz" lIns="91440" tIns="45720" rIns="91440" bIns="45720" rtlCol="0" anchor="ctr">
+            <a:normAutofit/>
+          </a:bodyPr>
+          <a:lstStyle/>
+          <a:p>
+            <a:pPr algn="l">
+              <a:spcAft>
+                <a:spcPts val="600"/>
+              </a:spcAft>
+            </a:pPr>
+            <a:r>
+              <a:rPr lang="en-US" kern="1200" dirty="0" err="1">
+                <a:solidFill>
+                  <a:schemeClr val="tx1">
+                    <a:tint val="75000"/>
+                  </a:schemeClr>
+                </a:solidFill>
+                <a:latin typeface="+mn-lt"/>
+                <a:ea typeface="+mn-ea"/>
+                <a:cs typeface="+mn-cs"/>
+              </a:rPr>
+              <a:t>Projet</a:t>
+            </a:r>
+            <a:r>
+              <a:rPr lang="en-US" kern="1200" dirty="0">
+                <a:solidFill>
+                  <a:schemeClr val="tx1">
+                    <a:tint val="75000"/>
+                  </a:schemeClr>
+                </a:solidFill>
+                <a:latin typeface="+mn-lt"/>
+                <a:ea typeface="+mn-ea"/>
+                <a:cs typeface="+mn-cs"/>
+              </a:rPr>
+              <a:t> </a:t>
+            </a:r>
+            <a:r>
+              <a:rPr lang="en-US" kern="1200" dirty="0" err="1">
+                <a:solidFill>
+                  <a:schemeClr val="tx1">
+                    <a:tint val="75000"/>
+                  </a:schemeClr>
+                </a:solidFill>
+                <a:latin typeface="+mn-lt"/>
+                <a:ea typeface="+mn-ea"/>
+                <a:cs typeface="+mn-cs"/>
+              </a:rPr>
+              <a:t>Intégrateur</a:t>
+            </a:r>
+            <a:r>
+              <a:rPr lang="en-US" kern="1200" dirty="0">
+                <a:solidFill>
+                  <a:schemeClr val="tx1">
+                    <a:tint val="75000"/>
+                  </a:schemeClr>
+                </a:solidFill>
+                <a:latin typeface="+mn-lt"/>
+                <a:ea typeface="+mn-ea"/>
+                <a:cs typeface="+mn-cs"/>
+              </a:rPr>
+              <a:t> L2 NEC</a:t>
+            </a:r>
+          </a:p>
+        </p:txBody>
+      </p:sp>
+      <p:sp>
+        <p:nvSpPr>
+          <p:cNvPr id="6" name="Espace réservé du numéro de diapositive 5">
+            <a:extLst>
+              <a:ext uri="{FF2B5EF4-FFF2-40B4-BE49-F238E27FC236}">
+                <a16:creationId xmlns:a16="http://schemas.microsoft.com/office/drawing/2014/main" id="{EC2E1A56-6DD0-E48E-D864-2167282DCDC8}"/>
+              </a:ext>
+            </a:extLst>
+          </p:cNvPr>
+          <p:cNvSpPr>
+            <a:spLocks noGrp="1"/>
+          </p:cNvSpPr>
+          <p:nvPr>
+            <p:ph type="sldNum" sz="quarter" idx="12"/>
+          </p:nvPr>
+        </p:nvSpPr>
+        <p:spPr>
+          <a:xfrm>
+            <a:off x="10926476" y="6356350"/>
+            <a:ext cx="625443" cy="365125"/>
+          </a:xfrm>
+          <a:noFill/>
+        </p:spPr>
+        <p:txBody>
+          <a:bodyPr vert="horz" lIns="91440" tIns="45720" rIns="91440" bIns="45720" rtlCol="0" anchor="ctr">
+            <a:normAutofit/>
+          </a:bodyPr>
+          <a:lstStyle/>
+          <a:p>
+            <a:pPr algn="l">
+              <a:spcAft>
+                <a:spcPts val="600"/>
+              </a:spcAft>
+            </a:pPr>
+            <a:fld id="{915BF9B4-2D6F-7943-B02D-01F59FFE0C5F}" type="slidenum">
+              <a:rPr lang="en-US" smtClean="0">
+                <a:solidFill>
+                  <a:schemeClr val="tx1">
+                    <a:tint val="75000"/>
+                  </a:schemeClr>
+                </a:solidFill>
+              </a:rPr>
+              <a:pPr algn="l">
+                <a:spcAft>
+                  <a:spcPts val="600"/>
+                </a:spcAft>
+              </a:pPr>
+              <a:t>4</a:t>
+            </a:fld>
+            <a:endParaRPr lang="en-US">
+              <a:solidFill>
+                <a:schemeClr val="tx1">
+                  <a:tint val="75000"/>
+                </a:schemeClr>
+              </a:solidFill>
+            </a:endParaRPr>
+          </a:p>
+        </p:txBody>
+      </p:sp>
+    </p:spTree>
+    <p:extLst>
+      <p:ext uri="{BB962C8B-B14F-4D97-AF65-F5344CB8AC3E}">
+        <p14:creationId xmlns:p14="http://schemas.microsoft.com/office/powerpoint/2010/main" val="3893676218"/>
+      </p:ext>
+    </p:extLst>
+  </p:cSld>
+  <p:clrMapOvr>
+    <a:masterClrMapping/>
+  </p:clrMapOvr>
+</p:sld>
+</file>
+
+<file path=ppt/slides/slide5.xml><?xml version="1.0" encoding="utf-8"?>
+<p:sld xmlns:a="http://schemas.openxmlformats.org/drawingml/2006/main" xmlns:r="http://schemas.openxmlformats.org/officeDocument/2006/relationships" xmlns:p="http://schemas.openxmlformats.org/presentationml/2006/main">
+  <p:cSld>
+    <p:spTree>
+      <p:nvGrpSpPr>
+        <p:cNvPr id="1" name=""/>
+        <p:cNvGrpSpPr/>
+        <p:nvPr/>
+      </p:nvGrpSpPr>
+      <p:grpSpPr>
+        <a:xfrm>
+          <a:off x="0" y="0"/>
+          <a:ext cx="0" cy="0"/>
+          <a:chOff x="0" y="0"/>
+          <a:chExt cx="0" cy="0"/>
+        </a:xfrm>
+      </p:grpSpPr>
+      <p:sp>
+        <p:nvSpPr>
           <p:cNvPr id="2" name="Titre 1">
             <a:extLst>
               <a:ext uri="{FF2B5EF4-FFF2-40B4-BE49-F238E27FC236}">
@@ -8096,7 +8431,7 @@
             <a:pPr algn="ctr"/>
             <a:r>
               <a:rPr lang="fr-FR" sz="4000" dirty="0"/>
-              <a:t>II. Présentation du SWOT</a:t>
+              <a:t>III. Présentation du SWOT</a:t>
             </a:r>
           </a:p>
         </p:txBody>
@@ -8152,7 +8487,7 @@
           <a:p>
             <a:fld id="{915BF9B4-2D6F-7943-B02D-01F59FFE0C5F}" type="slidenum">
               <a:rPr lang="fr-FR" smtClean="0"/>
-              <a:t>4</a:t>
+              <a:t>5</a:t>
             </a:fld>
             <a:endParaRPr lang="fr-FR"/>
           </a:p>
@@ -8173,14 +8508,14 @@
           <p:nvPr>
             <p:extLst>
               <p:ext uri="{D42A27DB-BD31-4B8C-83A1-F6EECF244321}">
-                <p14:modId xmlns:p14="http://schemas.microsoft.com/office/powerpoint/2010/main" val="3210086856"/>
+                <p14:modId xmlns:p14="http://schemas.microsoft.com/office/powerpoint/2010/main" val="2097234161"/>
               </p:ext>
             </p:extLst>
           </p:nvPr>
         </p:nvGraphicFramePr>
         <p:xfrm>
           <a:off x="2016369" y="1909237"/>
-          <a:ext cx="8159261" cy="3039526"/>
+          <a:ext cx="8159261" cy="3433962"/>
         </p:xfrm>
         <a:graphic>
           <a:graphicData uri="http://schemas.openxmlformats.org/drawingml/2006/table">
@@ -8288,12 +8623,12 @@
                         </a:spcAft>
                       </a:pPr>
                       <a:r>
-                        <a:rPr lang="fr-FR" sz="1600" kern="0" dirty="0">
+                        <a:rPr lang="fr-FR" sz="1800" kern="0" dirty="0">
                           <a:effectLst/>
                         </a:rPr>
                         <a:t>Origine interne</a:t>
                       </a:r>
-                      <a:endParaRPr lang="fr-FR" sz="1600" kern="100" dirty="0">
+                      <a:endParaRPr lang="fr-FR" sz="1800" kern="100" dirty="0">
                         <a:effectLst/>
                         <a:latin typeface="Aptos" panose="020B0004020202020204" pitchFamily="34" charset="0"/>
                         <a:ea typeface="Aptos" panose="020B0004020202020204" pitchFamily="34" charset="0"/>
@@ -8317,12 +8652,12 @@
                         </a:spcAft>
                       </a:pPr>
                       <a:r>
-                        <a:rPr lang="fr-FR" sz="1600" kern="100" dirty="0">
+                        <a:rPr lang="fr-FR" sz="1800" kern="100" dirty="0">
                           <a:effectLst/>
                         </a:rPr>
                         <a:t>Conscience des fonctionnalités nécessaires du site </a:t>
                       </a:r>
-                      <a:endParaRPr lang="fr-FR" sz="1600" kern="100" dirty="0">
+                      <a:endParaRPr lang="fr-FR" sz="1800" kern="100" dirty="0">
                         <a:effectLst/>
                         <a:latin typeface="Aptos" panose="020B0004020202020204" pitchFamily="34" charset="0"/>
                         <a:ea typeface="Aptos" panose="020B0004020202020204" pitchFamily="34" charset="0"/>
@@ -8346,17 +8681,30 @@
                         </a:spcAft>
                       </a:pPr>
                       <a:r>
-                        <a:rPr lang="fr-FR" sz="1600" kern="100" dirty="0">
+                        <a:rPr lang="fr-FR" sz="1800" kern="100" dirty="0">
                           <a:effectLst/>
                         </a:rPr>
-                        <a:t>Fonctionnalités compliquées à mettre en place </a:t>
+                        <a:t>Fonctionnalités compliquées à mettre en place.</a:t>
                       </a:r>
-                      <a:endParaRPr lang="fr-FR" sz="1600" kern="100" dirty="0">
-                        <a:effectLst/>
-                        <a:latin typeface="Aptos" panose="020B0004020202020204" pitchFamily="34" charset="0"/>
-                        <a:ea typeface="Aptos" panose="020B0004020202020204" pitchFamily="34" charset="0"/>
-                        <a:cs typeface="Times New Roman" panose="02020603050405020304" pitchFamily="18" charset="0"/>
-                      </a:endParaRPr>
+                    </a:p>
+                    <a:p>
+                      <a:pPr algn="l">
+                        <a:lnSpc>
+                          <a:spcPct val="107000"/>
+                        </a:lnSpc>
+                        <a:spcAft>
+                          <a:spcPts val="800"/>
+                        </a:spcAft>
+                      </a:pPr>
+                      <a:r>
+                        <a:rPr lang="fr-FR" sz="1800" kern="100" dirty="0">
+                          <a:effectLst/>
+                          <a:latin typeface="Aptos" panose="020B0004020202020204" pitchFamily="34" charset="0"/>
+                          <a:ea typeface="Aptos" panose="020B0004020202020204" pitchFamily="34" charset="0"/>
+                          <a:cs typeface="Times New Roman" panose="02020603050405020304" pitchFamily="18" charset="0"/>
+                        </a:rPr>
+                        <a:t>Pas de contact direct avec le client.</a:t>
+                      </a:r>
                     </a:p>
                   </a:txBody>
                   <a:tcPr marL="45041" marR="45041" marT="0" marB="0"/>
@@ -8382,12 +8730,12 @@
                         </a:spcAft>
                       </a:pPr>
                       <a:r>
-                        <a:rPr lang="fr-FR" sz="1600" kern="0">
+                        <a:rPr lang="fr-FR" sz="1800" kern="0">
                           <a:effectLst/>
                         </a:rPr>
                         <a:t>Origine externe</a:t>
                       </a:r>
-                      <a:endParaRPr lang="fr-FR" sz="1600" kern="100">
+                      <a:endParaRPr lang="fr-FR" sz="1800" kern="100">
                         <a:effectLst/>
                         <a:latin typeface="Aptos" panose="020B0004020202020204" pitchFamily="34" charset="0"/>
                         <a:ea typeface="Aptos" panose="020B0004020202020204" pitchFamily="34" charset="0"/>
@@ -8411,17 +8759,11 @@
                         </a:spcAft>
                       </a:pPr>
                       <a:r>
-                        <a:rPr lang="fr-FR" sz="1600" kern="100" dirty="0">
+                        <a:rPr lang="fr-FR" sz="1800" kern="100" dirty="0">
                           <a:effectLst/>
                         </a:rPr>
-                        <a:t>Utilité concrète et besoin immédiat d’un site </a:t>
+                        <a:t>Utilité concrète et besoin immédiat d’un site.</a:t>
                       </a:r>
-                      <a:endParaRPr lang="fr-FR" sz="1600" kern="100" dirty="0">
-                        <a:effectLst/>
-                        <a:latin typeface="Aptos" panose="020B0004020202020204" pitchFamily="34" charset="0"/>
-                        <a:ea typeface="Aptos" panose="020B0004020202020204" pitchFamily="34" charset="0"/>
-                        <a:cs typeface="Times New Roman" panose="02020603050405020304" pitchFamily="18" charset="0"/>
-                      </a:endParaRPr>
                     </a:p>
                   </a:txBody>
                   <a:tcPr marL="45041" marR="45041" marT="0" marB="0"/>
@@ -8440,12 +8782,12 @@
                         </a:spcAft>
                       </a:pPr>
                       <a:r>
-                        <a:rPr lang="fr-FR" sz="1600" kern="100" dirty="0">
+                        <a:rPr lang="fr-FR" sz="1800" kern="100" dirty="0">
                           <a:effectLst/>
                         </a:rPr>
                         <a:t>Repose sur l’UPPA, si le projet est annulé, plus d’utilité pour notre site</a:t>
                       </a:r>
-                      <a:endParaRPr lang="fr-FR" sz="1600" kern="100" dirty="0">
+                      <a:endParaRPr lang="fr-FR" sz="1800" kern="100" dirty="0">
                         <a:effectLst/>
                         <a:latin typeface="Aptos" panose="020B0004020202020204" pitchFamily="34" charset="0"/>
                         <a:ea typeface="Aptos" panose="020B0004020202020204" pitchFamily="34" charset="0"/>
@@ -8478,7 +8820,7 @@
 </p:sld>
 </file>
 
-<file path=ppt/slides/slide5.xml><?xml version="1.0" encoding="utf-8"?>
+<file path=ppt/slides/slide6.xml><?xml version="1.0" encoding="utf-8"?>
 <p:sld xmlns:a="http://schemas.openxmlformats.org/drawingml/2006/main" xmlns:r="http://schemas.openxmlformats.org/officeDocument/2006/relationships" xmlns:p="http://schemas.openxmlformats.org/presentationml/2006/main">
   <p:cSld>
     <p:spTree>
@@ -8521,7 +8863,7 @@
             <a:pPr algn="ctr"/>
             <a:r>
               <a:rPr lang="fr-FR" sz="4000" dirty="0"/>
-              <a:t>III. Présentation du SMART</a:t>
+              <a:t>IV. Présentation du SMART</a:t>
             </a:r>
           </a:p>
         </p:txBody>
@@ -8577,7 +8919,7 @@
           <a:p>
             <a:fld id="{915BF9B4-2D6F-7943-B02D-01F59FFE0C5F}" type="slidenum">
               <a:rPr lang="fr-FR" smtClean="0"/>
-              <a:t>5</a:t>
+              <a:t>6</a:t>
             </a:fld>
             <a:endParaRPr lang="fr-FR"/>
           </a:p>
@@ -8598,14 +8940,14 @@
           <p:nvPr>
             <p:extLst>
               <p:ext uri="{D42A27DB-BD31-4B8C-83A1-F6EECF244321}">
-                <p14:modId xmlns:p14="http://schemas.microsoft.com/office/powerpoint/2010/main" val="2573137740"/>
+                <p14:modId xmlns:p14="http://schemas.microsoft.com/office/powerpoint/2010/main" val="179449679"/>
               </p:ext>
             </p:extLst>
           </p:nvPr>
         </p:nvGraphicFramePr>
         <p:xfrm>
-          <a:off x="2590800" y="1680395"/>
-          <a:ext cx="7010400" cy="4130296"/>
+          <a:off x="2054860" y="1889760"/>
+          <a:ext cx="8082280" cy="3866896"/>
         </p:xfrm>
         <a:graphic>
           <a:graphicData uri="http://schemas.openxmlformats.org/drawingml/2006/table">
@@ -8614,14 +8956,14 @@
                 <a:tableStyleId>{5C22544A-7EE6-4342-B048-85BDC9FD1C3A}</a:tableStyleId>
               </a:tblPr>
               <a:tblGrid>
-                <a:gridCol w="3505200">
+                <a:gridCol w="3069841">
                   <a:extLst>
                     <a:ext uri="{9D8B030D-6E8A-4147-A177-3AD203B41FA5}">
                       <a16:colId xmlns:a16="http://schemas.microsoft.com/office/drawing/2014/main" val="3073079697"/>
                     </a:ext>
                   </a:extLst>
                 </a:gridCol>
-                <a:gridCol w="3505200">
+                <a:gridCol w="5012439">
                   <a:extLst>
                     <a:ext uri="{9D8B030D-6E8A-4147-A177-3AD203B41FA5}">
                       <a16:colId xmlns:a16="http://schemas.microsoft.com/office/drawing/2014/main" val="2834109006"/>
@@ -8629,7 +8971,7 @@
                   </a:extLst>
                 </a:gridCol>
               </a:tblGrid>
-              <a:tr h="0">
+              <a:tr h="1547682">
                 <a:tc>
                   <a:txBody>
                     <a:bodyPr/>
@@ -8644,12 +8986,12 @@
                         </a:spcAft>
                       </a:pPr>
                       <a:r>
-                        <a:rPr lang="fr-FR" sz="1600" kern="100" dirty="0" err="1">
+                        <a:rPr lang="fr-FR" sz="1800" kern="100" dirty="0" err="1">
                           <a:effectLst/>
                         </a:rPr>
                         <a:t>S-pecifique</a:t>
                       </a:r>
-                      <a:endParaRPr lang="fr-FR" sz="1600" kern="100" dirty="0">
+                      <a:endParaRPr lang="fr-FR" sz="1800" kern="100" dirty="0">
                         <a:effectLst/>
                         <a:latin typeface="Aptos" panose="020B0004020202020204" pitchFamily="34" charset="0"/>
                         <a:ea typeface="Aptos" panose="020B0004020202020204" pitchFamily="34" charset="0"/>
@@ -8673,7 +9015,7 @@
                         </a:spcAft>
                       </a:pPr>
                       <a:r>
-                        <a:rPr lang="fr-FR" sz="1600" b="0" kern="100" dirty="0">
+                        <a:rPr lang="fr-FR" sz="1800" b="0" kern="100" dirty="0">
                           <a:solidFill>
                             <a:schemeClr val="tx1"/>
                           </a:solidFill>
@@ -8682,7 +9024,7 @@
                         <a:t>créer un site qui permettrai à des utilisateurs de l’</a:t>
                       </a:r>
                       <a:r>
-                        <a:rPr lang="fr-FR" sz="1600" b="0" kern="100" dirty="0" err="1">
+                        <a:rPr lang="fr-FR" sz="1800" b="0" kern="100" dirty="0" err="1">
                           <a:solidFill>
                             <a:schemeClr val="tx1"/>
                           </a:solidFill>
@@ -8691,7 +9033,7 @@
                         <a:t>uppa</a:t>
                       </a:r>
                       <a:r>
-                        <a:rPr lang="fr-FR" sz="1600" b="0" kern="100" dirty="0">
+                        <a:rPr lang="fr-FR" sz="1800" b="0" kern="100" dirty="0">
                           <a:solidFill>
                             <a:schemeClr val="tx1"/>
                           </a:solidFill>
@@ -8700,7 +9042,7 @@
                         <a:t> de réserver des trajets de navette (Anglet</a:t>
                       </a:r>
                       <a:r>
-                        <a:rPr lang="fr-FR" sz="1600" b="0" kern="100" dirty="0">
+                        <a:rPr lang="fr-FR" sz="1800" b="0" kern="100" dirty="0">
                           <a:solidFill>
                             <a:schemeClr val="tx1"/>
                           </a:solidFill>
@@ -8710,7 +9052,7 @@
                         <a:t></a:t>
                       </a:r>
                       <a:r>
-                        <a:rPr lang="fr-FR" sz="1600" b="0" kern="100" dirty="0">
+                        <a:rPr lang="fr-FR" sz="1800" b="0" kern="100" dirty="0">
                           <a:solidFill>
                             <a:schemeClr val="tx1"/>
                           </a:solidFill>
@@ -8718,7 +9060,35 @@
                         </a:rPr>
                         <a:t>Pau) simplement </a:t>
                       </a:r>
-                      <a:endParaRPr lang="fr-FR" sz="1600" b="0" kern="100" dirty="0">
+                    </a:p>
+                    <a:p>
+                      <a:pPr marL="0" marR="0" lvl="0" indent="0" algn="l" defTabSz="914400" rtl="0" eaLnBrk="1" fontAlgn="auto" latinLnBrk="0" hangingPunct="1">
+                        <a:lnSpc>
+                          <a:spcPct val="107000"/>
+                        </a:lnSpc>
+                        <a:spcBef>
+                          <a:spcPts val="0"/>
+                        </a:spcBef>
+                        <a:spcAft>
+                          <a:spcPts val="800"/>
+                        </a:spcAft>
+                        <a:buClrTx/>
+                        <a:buSzTx/>
+                        <a:buFontTx/>
+                        <a:buNone/>
+                        <a:tabLst/>
+                        <a:defRPr/>
+                      </a:pPr>
+                      <a:r>
+                        <a:rPr lang="fr-FR" sz="1800" b="0" kern="100" dirty="0">
+                          <a:solidFill>
+                            <a:schemeClr val="tx1"/>
+                          </a:solidFill>
+                          <a:effectLst/>
+                        </a:rPr>
+                        <a:t>Il faut que les réservations persistent, soient annulables, modifiables, consultables</a:t>
+                      </a:r>
+                      <a:endParaRPr lang="fr-FR" sz="1800" b="0" kern="100" dirty="0">
                         <a:solidFill>
                           <a:schemeClr val="tx1"/>
                         </a:solidFill>
@@ -8743,7 +9113,7 @@
                   </a:ext>
                 </a:extLst>
               </a:tr>
-              <a:tr h="0">
+              <a:tr h="568151">
                 <a:tc>
                   <a:txBody>
                     <a:bodyPr/>
@@ -8758,12 +9128,12 @@
                         </a:spcAft>
                       </a:pPr>
                       <a:r>
-                        <a:rPr lang="fr-FR" sz="1600" kern="100" dirty="0" err="1">
+                        <a:rPr lang="fr-FR" sz="1800" kern="100" dirty="0" err="1">
                           <a:effectLst/>
                         </a:rPr>
                         <a:t>M-esurable</a:t>
                       </a:r>
-                      <a:endParaRPr lang="fr-FR" sz="1600" kern="100" dirty="0">
+                      <a:endParaRPr lang="fr-FR" sz="1800" kern="100" dirty="0">
                         <a:effectLst/>
                         <a:latin typeface="Aptos" panose="020B0004020202020204" pitchFamily="34" charset="0"/>
                         <a:ea typeface="Aptos" panose="020B0004020202020204" pitchFamily="34" charset="0"/>
@@ -8787,17 +9157,14 @@
                         </a:spcAft>
                       </a:pPr>
                       <a:r>
-                        <a:rPr lang="fr-FR" sz="1600" kern="100" dirty="0">
+                        <a:rPr lang="fr-FR" sz="1800" kern="100" dirty="0">
                           <a:effectLst/>
+                          <a:latin typeface="Aptos" panose="020B0004020202020204" pitchFamily="34" charset="0"/>
+                          <a:ea typeface="Aptos" panose="020B0004020202020204" pitchFamily="34" charset="0"/>
+                          <a:cs typeface="Times New Roman" panose="02020603050405020304" pitchFamily="18" charset="0"/>
                         </a:rPr>
-                        <a:t>Il faut que les réservations persistent, soient annulables, modifiables, consultables</a:t>
+                        <a:t>Récolte de données en tout genre, comme le nombre de réservations moyen, etc…</a:t>
                       </a:r>
-                      <a:endParaRPr lang="fr-FR" sz="1600" kern="100" dirty="0">
-                        <a:effectLst/>
-                        <a:latin typeface="Aptos" panose="020B0004020202020204" pitchFamily="34" charset="0"/>
-                        <a:ea typeface="Aptos" panose="020B0004020202020204" pitchFamily="34" charset="0"/>
-                        <a:cs typeface="Times New Roman" panose="02020603050405020304" pitchFamily="18" charset="0"/>
-                      </a:endParaRPr>
                     </a:p>
                   </a:txBody>
                   <a:tcPr marL="68580" marR="68580" marT="0" marB="0">
@@ -8814,7 +9181,7 @@
                   </a:ext>
                 </a:extLst>
               </a:tr>
-              <a:tr h="0">
+              <a:tr h="568151">
                 <a:tc>
                   <a:txBody>
                     <a:bodyPr/>
@@ -8829,12 +9196,12 @@
                         </a:spcAft>
                       </a:pPr>
                       <a:r>
-                        <a:rPr lang="fr-FR" sz="1600" kern="100" dirty="0" err="1">
+                        <a:rPr lang="fr-FR" sz="1800" kern="100" dirty="0" err="1">
                           <a:effectLst/>
                         </a:rPr>
                         <a:t>A-tteignable</a:t>
                       </a:r>
-                      <a:endParaRPr lang="fr-FR" sz="1600" kern="100" dirty="0">
+                      <a:endParaRPr lang="fr-FR" sz="1800" kern="100" dirty="0">
                         <a:effectLst/>
                         <a:latin typeface="Aptos" panose="020B0004020202020204" pitchFamily="34" charset="0"/>
                         <a:ea typeface="Aptos" panose="020B0004020202020204" pitchFamily="34" charset="0"/>
@@ -8858,12 +9225,12 @@
                         </a:spcAft>
                       </a:pPr>
                       <a:r>
-                        <a:rPr lang="fr-FR" sz="1600" kern="100" dirty="0">
+                        <a:rPr lang="fr-FR" sz="1800" kern="100" dirty="0">
                           <a:effectLst/>
                         </a:rPr>
                         <a:t>Avoir un site qui fonctionne et permet de faire des réservations, de les afficher, et de remplir un BD</a:t>
                       </a:r>
-                      <a:endParaRPr lang="fr-FR" sz="1600" kern="100" dirty="0">
+                      <a:endParaRPr lang="fr-FR" sz="1800" kern="100" dirty="0">
                         <a:effectLst/>
                         <a:latin typeface="Aptos" panose="020B0004020202020204" pitchFamily="34" charset="0"/>
                         <a:ea typeface="Aptos" panose="020B0004020202020204" pitchFamily="34" charset="0"/>
@@ -8885,7 +9252,7 @@
                   </a:ext>
                 </a:extLst>
               </a:tr>
-              <a:tr h="0">
+              <a:tr h="279153">
                 <a:tc>
                   <a:txBody>
                     <a:bodyPr/>
@@ -8900,12 +9267,12 @@
                         </a:spcAft>
                       </a:pPr>
                       <a:r>
-                        <a:rPr lang="fr-FR" sz="1600" kern="100">
+                        <a:rPr lang="fr-FR" sz="1800" kern="100" dirty="0" err="1">
                           <a:effectLst/>
                         </a:rPr>
-                        <a:t>R-elevant</a:t>
+                        <a:t>R-éalisable</a:t>
                       </a:r>
-                      <a:endParaRPr lang="fr-FR" sz="1600" kern="100">
+                      <a:endParaRPr lang="fr-FR" sz="1800" kern="100" dirty="0">
                         <a:effectLst/>
                         <a:latin typeface="Aptos" panose="020B0004020202020204" pitchFamily="34" charset="0"/>
                         <a:ea typeface="Aptos" panose="020B0004020202020204" pitchFamily="34" charset="0"/>
@@ -8929,17 +9296,14 @@
                         </a:spcAft>
                       </a:pPr>
                       <a:r>
-                        <a:rPr lang="fr-FR" sz="1600" kern="100" dirty="0">
+                        <a:rPr lang="fr-FR" sz="1800" kern="100" dirty="0">
                           <a:effectLst/>
+                          <a:latin typeface="Aptos" panose="020B0004020202020204" pitchFamily="34" charset="0"/>
+                          <a:ea typeface="Aptos" panose="020B0004020202020204" pitchFamily="34" charset="0"/>
+                          <a:cs typeface="Times New Roman" panose="02020603050405020304" pitchFamily="18" charset="0"/>
                         </a:rPr>
-                        <a:t> </a:t>
+                        <a:t>Pas de difficulté évidente </a:t>
                       </a:r>
-                      <a:endParaRPr lang="fr-FR" sz="1600" kern="100" dirty="0">
-                        <a:effectLst/>
-                        <a:latin typeface="Aptos" panose="020B0004020202020204" pitchFamily="34" charset="0"/>
-                        <a:ea typeface="Aptos" panose="020B0004020202020204" pitchFamily="34" charset="0"/>
-                        <a:cs typeface="Times New Roman" panose="02020603050405020304" pitchFamily="18" charset="0"/>
-                      </a:endParaRPr>
                     </a:p>
                   </a:txBody>
                   <a:tcPr marL="68580" marR="68580" marT="0" marB="0">
@@ -8956,7 +9320,7 @@
                   </a:ext>
                 </a:extLst>
               </a:tr>
-              <a:tr h="0">
+              <a:tr h="857151">
                 <a:tc>
                   <a:txBody>
                     <a:bodyPr/>
@@ -8971,12 +9335,12 @@
                         </a:spcAft>
                       </a:pPr>
                       <a:r>
-                        <a:rPr lang="fr-FR" sz="1600" kern="100">
+                        <a:rPr lang="fr-FR" sz="1800" kern="100">
                           <a:effectLst/>
                         </a:rPr>
                         <a:t>T-emporellement</a:t>
                       </a:r>
-                      <a:endParaRPr lang="fr-FR" sz="1600" kern="100">
+                      <a:endParaRPr lang="fr-FR" sz="1800" kern="100">
                         <a:effectLst/>
                         <a:latin typeface="Aptos" panose="020B0004020202020204" pitchFamily="34" charset="0"/>
                         <a:ea typeface="Aptos" panose="020B0004020202020204" pitchFamily="34" charset="0"/>
@@ -9000,12 +9364,12 @@
                         </a:spcAft>
                       </a:pPr>
                       <a:r>
-                        <a:rPr lang="fr-FR" sz="1600" kern="100" dirty="0">
+                        <a:rPr lang="fr-FR" sz="1800" kern="100" dirty="0">
                           <a:effectLst/>
                         </a:rPr>
                         <a:t>Une bonne ébauche pour le 18 mars (?) pour le présenter et motiver l’administration à garder la navette et finir projet pour le 7 mai (dernier cours)</a:t>
                       </a:r>
-                      <a:endParaRPr lang="fr-FR" sz="1600" kern="100" dirty="0">
+                      <a:endParaRPr lang="fr-FR" sz="1800" kern="100" dirty="0">
                         <a:effectLst/>
                         <a:latin typeface="Aptos" panose="020B0004020202020204" pitchFamily="34" charset="0"/>
                         <a:ea typeface="Aptos" panose="020B0004020202020204" pitchFamily="34" charset="0"/>
@@ -9044,595 +9408,7 @@
 </p:sld>
 </file>
 
-<file path=ppt/slides/slide6.xml><?xml version="1.0" encoding="utf-8"?>
-<p:sld xmlns:a="http://schemas.openxmlformats.org/drawingml/2006/main" xmlns:r="http://schemas.openxmlformats.org/officeDocument/2006/relationships" xmlns:p="http://schemas.openxmlformats.org/presentationml/2006/main">
-  <p:cSld>
-    <p:bg>
-      <p:bgPr>
-        <a:solidFill>
-          <a:schemeClr val="bg1"/>
-        </a:solidFill>
-        <a:effectLst/>
-      </p:bgPr>
-    </p:bg>
-    <p:spTree>
-      <p:nvGrpSpPr>
-        <p:cNvPr id="1" name=""/>
-        <p:cNvGrpSpPr/>
-        <p:nvPr/>
-      </p:nvGrpSpPr>
-      <p:grpSpPr>
-        <a:xfrm>
-          <a:off x="0" y="0"/>
-          <a:ext cx="0" cy="0"/>
-          <a:chOff x="0" y="0"/>
-          <a:chExt cx="0" cy="0"/>
-        </a:xfrm>
-      </p:grpSpPr>
-      <p:sp>
-        <p:nvSpPr>
-          <p:cNvPr id="16" name="Flowchart: Document 15">
-            <a:extLst>
-              <a:ext uri="{FF2B5EF4-FFF2-40B4-BE49-F238E27FC236}">
-                <a16:creationId xmlns:a16="http://schemas.microsoft.com/office/drawing/2014/main" id="{D12DDE76-C203-4047-9998-63900085B5E8}"/>
-              </a:ext>
-              <a:ext uri="{C183D7F6-B498-43B3-948B-1728B52AA6E4}">
-                <adec:decorative xmlns:adec="http://schemas.microsoft.com/office/drawing/2017/decorative" val="1"/>
-              </a:ext>
-            </a:extLst>
-          </p:cNvPr>
-          <p:cNvSpPr>
-            <a:spLocks noGrp="1" noRot="1" noChangeAspect="1" noMove="1" noResize="1" noEditPoints="1" noAdjustHandles="1" noChangeArrowheads="1" noChangeShapeType="1" noTextEdit="1"/>
-          </p:cNvSpPr>
-          <p:nvPr>
-            <p:extLst>
-              <p:ext uri="{386F3935-93C4-4BCD-93E2-E3B085C9AB24}">
-                <p16:designElem xmlns:p16="http://schemas.microsoft.com/office/powerpoint/2015/main" val="1"/>
-              </p:ext>
-            </p:extLst>
-          </p:nvPr>
-        </p:nvSpPr>
-        <p:spPr>
-          <a:xfrm>
-            <a:off x="638175" y="0"/>
-            <a:ext cx="3248025" cy="3400426"/>
-          </a:xfrm>
-          <a:prstGeom prst="flowChartDocument">
-            <a:avLst/>
-          </a:prstGeom>
-          <a:solidFill>
-            <a:schemeClr val="accent1"/>
-          </a:solidFill>
-          <a:ln>
-            <a:noFill/>
-          </a:ln>
-        </p:spPr>
-        <p:style>
-          <a:lnRef idx="2">
-            <a:schemeClr val="accent1">
-              <a:shade val="50000"/>
-            </a:schemeClr>
-          </a:lnRef>
-          <a:fillRef idx="1">
-            <a:schemeClr val="accent1"/>
-          </a:fillRef>
-          <a:effectRef idx="0">
-            <a:schemeClr val="accent1"/>
-          </a:effectRef>
-          <a:fontRef idx="minor">
-            <a:schemeClr val="lt1"/>
-          </a:fontRef>
-        </p:style>
-        <p:txBody>
-          <a:bodyPr rtlCol="0" anchor="ctr"/>
-          <a:lstStyle/>
-          <a:p>
-            <a:pPr algn="ctr"/>
-            <a:endParaRPr lang="en-US"/>
-          </a:p>
-        </p:txBody>
-      </p:sp>
-      <p:sp>
-        <p:nvSpPr>
-          <p:cNvPr id="2" name="Titre 1">
-            <a:extLst>
-              <a:ext uri="{FF2B5EF4-FFF2-40B4-BE49-F238E27FC236}">
-                <a16:creationId xmlns:a16="http://schemas.microsoft.com/office/drawing/2014/main" id="{2AEF988E-03ED-203D-A2B1-E6D0277BCFED}"/>
-              </a:ext>
-            </a:extLst>
-          </p:cNvPr>
-          <p:cNvSpPr>
-            <a:spLocks noGrp="1"/>
-          </p:cNvSpPr>
-          <p:nvPr>
-            <p:ph type="title"/>
-          </p:nvPr>
-        </p:nvSpPr>
-        <p:spPr>
-          <a:xfrm>
-            <a:off x="838200" y="171162"/>
-            <a:ext cx="2840182" cy="2371148"/>
-          </a:xfrm>
-        </p:spPr>
-        <p:txBody>
-          <a:bodyPr vert="horz" lIns="91440" tIns="45720" rIns="91440" bIns="45720" rtlCol="0" anchor="ctr">
-            <a:normAutofit/>
-          </a:bodyPr>
-          <a:lstStyle/>
-          <a:p>
-            <a:r>
-              <a:rPr lang="en-US" sz="3200" kern="1200">
-                <a:solidFill>
-                  <a:srgbClr val="FFFFFF"/>
-                </a:solidFill>
-                <a:latin typeface="+mj-lt"/>
-                <a:ea typeface="+mj-ea"/>
-                <a:cs typeface="+mj-cs"/>
-              </a:rPr>
-              <a:t>IV. Présentation du QUINTILIEN</a:t>
-            </a:r>
-          </a:p>
-        </p:txBody>
-      </p:sp>
-      <p:pic>
-        <p:nvPicPr>
-          <p:cNvPr id="11" name="Espace réservé du contenu 10" descr="Une image contenant texte, cercle, Police, capture d’écran&#10;&#10;Description générée automatiquement">
-            <a:extLst>
-              <a:ext uri="{FF2B5EF4-FFF2-40B4-BE49-F238E27FC236}">
-                <a16:creationId xmlns:a16="http://schemas.microsoft.com/office/drawing/2014/main" id="{602121B6-C221-9E27-EB1D-7ED7C4988872}"/>
-              </a:ext>
-            </a:extLst>
-          </p:cNvPr>
-          <p:cNvPicPr>
-            <a:picLocks noGrp="1" noChangeAspect="1"/>
-          </p:cNvPicPr>
-          <p:nvPr>
-            <p:ph idx="1"/>
-          </p:nvPr>
-        </p:nvPicPr>
-        <p:blipFill>
-          <a:blip r:embed="rId2"/>
-          <a:stretch>
-            <a:fillRect/>
-          </a:stretch>
-        </p:blipFill>
-        <p:spPr>
-          <a:xfrm>
-            <a:off x="4615225" y="318382"/>
-            <a:ext cx="6738575" cy="6037968"/>
-          </a:xfrm>
-          <a:prstGeom prst="rect">
-            <a:avLst/>
-          </a:prstGeom>
-        </p:spPr>
-      </p:pic>
-      <p:sp>
-        <p:nvSpPr>
-          <p:cNvPr id="5" name="Espace réservé du pied de page 4">
-            <a:extLst>
-              <a:ext uri="{FF2B5EF4-FFF2-40B4-BE49-F238E27FC236}">
-                <a16:creationId xmlns:a16="http://schemas.microsoft.com/office/drawing/2014/main" id="{2D908748-EAFA-6705-763E-67505F094D79}"/>
-              </a:ext>
-            </a:extLst>
-          </p:cNvPr>
-          <p:cNvSpPr>
-            <a:spLocks noGrp="1"/>
-          </p:cNvSpPr>
-          <p:nvPr>
-            <p:ph type="ftr" sz="quarter" idx="11"/>
-          </p:nvPr>
-        </p:nvSpPr>
-        <p:spPr>
-          <a:xfrm>
-            <a:off x="838200" y="6356350"/>
-            <a:ext cx="5960951" cy="365125"/>
-          </a:xfrm>
-          <a:noFill/>
-        </p:spPr>
-        <p:txBody>
-          <a:bodyPr vert="horz" lIns="91440" tIns="45720" rIns="91440" bIns="45720" rtlCol="0" anchor="ctr">
-            <a:normAutofit/>
-          </a:bodyPr>
-          <a:lstStyle/>
-          <a:p>
-            <a:pPr algn="l">
-              <a:spcAft>
-                <a:spcPts val="600"/>
-              </a:spcAft>
-            </a:pPr>
-            <a:r>
-              <a:rPr lang="en-US" kern="1200">
-                <a:solidFill>
-                  <a:schemeClr val="tx1">
-                    <a:tint val="75000"/>
-                  </a:schemeClr>
-                </a:solidFill>
-                <a:latin typeface="+mn-lt"/>
-                <a:ea typeface="+mn-ea"/>
-                <a:cs typeface="+mn-cs"/>
-              </a:rPr>
-              <a:t>Projet Intégrateur L2NEC</a:t>
-            </a:r>
-          </a:p>
-        </p:txBody>
-      </p:sp>
-      <p:sp>
-        <p:nvSpPr>
-          <p:cNvPr id="6" name="Espace réservé du numéro de diapositive 5">
-            <a:extLst>
-              <a:ext uri="{FF2B5EF4-FFF2-40B4-BE49-F238E27FC236}">
-                <a16:creationId xmlns:a16="http://schemas.microsoft.com/office/drawing/2014/main" id="{EC2E1A56-6DD0-E48E-D864-2167282DCDC8}"/>
-              </a:ext>
-            </a:extLst>
-          </p:cNvPr>
-          <p:cNvSpPr>
-            <a:spLocks noGrp="1"/>
-          </p:cNvSpPr>
-          <p:nvPr>
-            <p:ph type="sldNum" sz="quarter" idx="12"/>
-          </p:nvPr>
-        </p:nvSpPr>
-        <p:spPr>
-          <a:xfrm>
-            <a:off x="10926476" y="6356350"/>
-            <a:ext cx="625443" cy="365125"/>
-          </a:xfrm>
-          <a:noFill/>
-        </p:spPr>
-        <p:txBody>
-          <a:bodyPr vert="horz" lIns="91440" tIns="45720" rIns="91440" bIns="45720" rtlCol="0" anchor="ctr">
-            <a:normAutofit/>
-          </a:bodyPr>
-          <a:lstStyle/>
-          <a:p>
-            <a:pPr algn="l">
-              <a:spcAft>
-                <a:spcPts val="600"/>
-              </a:spcAft>
-            </a:pPr>
-            <a:fld id="{915BF9B4-2D6F-7943-B02D-01F59FFE0C5F}" type="slidenum">
-              <a:rPr lang="en-US" smtClean="0">
-                <a:solidFill>
-                  <a:schemeClr val="tx1">
-                    <a:tint val="75000"/>
-                  </a:schemeClr>
-                </a:solidFill>
-              </a:rPr>
-              <a:pPr algn="l">
-                <a:spcAft>
-                  <a:spcPts val="600"/>
-                </a:spcAft>
-              </a:pPr>
-              <a:t>6</a:t>
-            </a:fld>
-            <a:endParaRPr lang="en-US">
-              <a:solidFill>
-                <a:schemeClr val="tx1">
-                  <a:tint val="75000"/>
-                </a:schemeClr>
-              </a:solidFill>
-            </a:endParaRPr>
-          </a:p>
-        </p:txBody>
-      </p:sp>
-    </p:spTree>
-    <p:extLst>
-      <p:ext uri="{BB962C8B-B14F-4D97-AF65-F5344CB8AC3E}">
-        <p14:creationId xmlns:p14="http://schemas.microsoft.com/office/powerpoint/2010/main" val="3893676218"/>
-      </p:ext>
-    </p:extLst>
-  </p:cSld>
-  <p:clrMapOvr>
-    <a:masterClrMapping/>
-  </p:clrMapOvr>
-</p:sld>
-</file>
-
 <file path=ppt/slides/slide7.xml><?xml version="1.0" encoding="utf-8"?>
-<p:sld xmlns:a="http://schemas.openxmlformats.org/drawingml/2006/main" xmlns:r="http://schemas.openxmlformats.org/officeDocument/2006/relationships" xmlns:p="http://schemas.openxmlformats.org/presentationml/2006/main">
-  <p:cSld>
-    <p:bg>
-      <p:bgPr>
-        <a:solidFill>
-          <a:schemeClr val="bg1"/>
-        </a:solidFill>
-        <a:effectLst/>
-      </p:bgPr>
-    </p:bg>
-    <p:spTree>
-      <p:nvGrpSpPr>
-        <p:cNvPr id="1" name=""/>
-        <p:cNvGrpSpPr/>
-        <p:nvPr/>
-      </p:nvGrpSpPr>
-      <p:grpSpPr>
-        <a:xfrm>
-          <a:off x="0" y="0"/>
-          <a:ext cx="0" cy="0"/>
-          <a:chOff x="0" y="0"/>
-          <a:chExt cx="0" cy="0"/>
-        </a:xfrm>
-      </p:grpSpPr>
-      <p:sp>
-        <p:nvSpPr>
-          <p:cNvPr id="21" name="Flowchart: Document 20">
-            <a:extLst>
-              <a:ext uri="{FF2B5EF4-FFF2-40B4-BE49-F238E27FC236}">
-                <a16:creationId xmlns:a16="http://schemas.microsoft.com/office/drawing/2014/main" id="{D12DDE76-C203-4047-9998-63900085B5E8}"/>
-              </a:ext>
-              <a:ext uri="{C183D7F6-B498-43B3-948B-1728B52AA6E4}">
-                <adec:decorative xmlns:adec="http://schemas.microsoft.com/office/drawing/2017/decorative" val="1"/>
-              </a:ext>
-            </a:extLst>
-          </p:cNvPr>
-          <p:cNvSpPr>
-            <a:spLocks noGrp="1" noRot="1" noChangeAspect="1" noMove="1" noResize="1" noEditPoints="1" noAdjustHandles="1" noChangeArrowheads="1" noChangeShapeType="1" noTextEdit="1"/>
-          </p:cNvSpPr>
-          <p:nvPr>
-            <p:extLst>
-              <p:ext uri="{386F3935-93C4-4BCD-93E2-E3B085C9AB24}">
-                <p16:designElem xmlns:p16="http://schemas.microsoft.com/office/powerpoint/2015/main" val="1"/>
-              </p:ext>
-            </p:extLst>
-          </p:nvPr>
-        </p:nvSpPr>
-        <p:spPr>
-          <a:xfrm>
-            <a:off x="638175" y="0"/>
-            <a:ext cx="3248025" cy="3400426"/>
-          </a:xfrm>
-          <a:prstGeom prst="flowChartDocument">
-            <a:avLst/>
-          </a:prstGeom>
-          <a:solidFill>
-            <a:schemeClr val="accent1"/>
-          </a:solidFill>
-          <a:ln>
-            <a:noFill/>
-          </a:ln>
-        </p:spPr>
-        <p:style>
-          <a:lnRef idx="2">
-            <a:schemeClr val="accent1">
-              <a:shade val="50000"/>
-            </a:schemeClr>
-          </a:lnRef>
-          <a:fillRef idx="1">
-            <a:schemeClr val="accent1"/>
-          </a:fillRef>
-          <a:effectRef idx="0">
-            <a:schemeClr val="accent1"/>
-          </a:effectRef>
-          <a:fontRef idx="minor">
-            <a:schemeClr val="lt1"/>
-          </a:fontRef>
-        </p:style>
-        <p:txBody>
-          <a:bodyPr rtlCol="0" anchor="ctr"/>
-          <a:lstStyle/>
-          <a:p>
-            <a:pPr algn="ctr"/>
-            <a:endParaRPr lang="en-US"/>
-          </a:p>
-        </p:txBody>
-      </p:sp>
-      <p:sp>
-        <p:nvSpPr>
-          <p:cNvPr id="2" name="Titre 1">
-            <a:extLst>
-              <a:ext uri="{FF2B5EF4-FFF2-40B4-BE49-F238E27FC236}">
-                <a16:creationId xmlns:a16="http://schemas.microsoft.com/office/drawing/2014/main" id="{2AEF988E-03ED-203D-A2B1-E6D0277BCFED}"/>
-              </a:ext>
-            </a:extLst>
-          </p:cNvPr>
-          <p:cNvSpPr>
-            <a:spLocks noGrp="1"/>
-          </p:cNvSpPr>
-          <p:nvPr>
-            <p:ph type="title"/>
-          </p:nvPr>
-        </p:nvSpPr>
-        <p:spPr>
-          <a:xfrm>
-            <a:off x="838200" y="171162"/>
-            <a:ext cx="2840182" cy="2371148"/>
-          </a:xfrm>
-        </p:spPr>
-        <p:txBody>
-          <a:bodyPr vert="horz" lIns="91440" tIns="45720" rIns="91440" bIns="45720" rtlCol="0" anchor="ctr">
-            <a:normAutofit/>
-          </a:bodyPr>
-          <a:lstStyle/>
-          <a:p>
-            <a:r>
-              <a:rPr lang="en-US" sz="3200" kern="1200" dirty="0">
-                <a:solidFill>
-                  <a:srgbClr val="FFFFFF"/>
-                </a:solidFill>
-                <a:latin typeface="+mj-lt"/>
-                <a:ea typeface="+mj-ea"/>
-                <a:cs typeface="+mj-cs"/>
-              </a:rPr>
-              <a:t>V. </a:t>
-            </a:r>
-            <a:r>
-              <a:rPr lang="en-US" sz="3200" kern="1200">
-                <a:solidFill>
-                  <a:srgbClr val="FFFFFF"/>
-                </a:solidFill>
-                <a:latin typeface="+mj-lt"/>
-                <a:ea typeface="+mj-ea"/>
-                <a:cs typeface="+mj-cs"/>
-              </a:rPr>
-              <a:t>Présentation</a:t>
-            </a:r>
-            <a:r>
-              <a:rPr lang="en-US" sz="3200" kern="1200" dirty="0">
-                <a:solidFill>
-                  <a:srgbClr val="FFFFFF"/>
-                </a:solidFill>
-                <a:latin typeface="+mj-lt"/>
-                <a:ea typeface="+mj-ea"/>
-                <a:cs typeface="+mj-cs"/>
-              </a:rPr>
-              <a:t> du DCU</a:t>
-            </a:r>
-          </a:p>
-        </p:txBody>
-      </p:sp>
-      <p:sp>
-        <p:nvSpPr>
-          <p:cNvPr id="5" name="Espace réservé du pied de page 4">
-            <a:extLst>
-              <a:ext uri="{FF2B5EF4-FFF2-40B4-BE49-F238E27FC236}">
-                <a16:creationId xmlns:a16="http://schemas.microsoft.com/office/drawing/2014/main" id="{2D908748-EAFA-6705-763E-67505F094D79}"/>
-              </a:ext>
-            </a:extLst>
-          </p:cNvPr>
-          <p:cNvSpPr>
-            <a:spLocks noGrp="1"/>
-          </p:cNvSpPr>
-          <p:nvPr>
-            <p:ph type="ftr" sz="quarter" idx="11"/>
-          </p:nvPr>
-        </p:nvSpPr>
-        <p:spPr>
-          <a:xfrm>
-            <a:off x="838200" y="6356350"/>
-            <a:ext cx="5960951" cy="365125"/>
-          </a:xfrm>
-          <a:noFill/>
-        </p:spPr>
-        <p:txBody>
-          <a:bodyPr vert="horz" lIns="91440" tIns="45720" rIns="91440" bIns="45720" rtlCol="0" anchor="ctr">
-            <a:normAutofit/>
-          </a:bodyPr>
-          <a:lstStyle/>
-          <a:p>
-            <a:pPr algn="l">
-              <a:spcAft>
-                <a:spcPts val="600"/>
-              </a:spcAft>
-            </a:pPr>
-            <a:r>
-              <a:rPr lang="en-US" kern="1200">
-                <a:solidFill>
-                  <a:schemeClr val="tx1">
-                    <a:tint val="75000"/>
-                  </a:schemeClr>
-                </a:solidFill>
-                <a:latin typeface="+mn-lt"/>
-                <a:ea typeface="+mn-ea"/>
-                <a:cs typeface="+mn-cs"/>
-              </a:rPr>
-              <a:t>Projet Intégrateur L2NEC</a:t>
-            </a:r>
-          </a:p>
-        </p:txBody>
-      </p:sp>
-      <p:sp>
-        <p:nvSpPr>
-          <p:cNvPr id="6" name="Espace réservé du numéro de diapositive 5">
-            <a:extLst>
-              <a:ext uri="{FF2B5EF4-FFF2-40B4-BE49-F238E27FC236}">
-                <a16:creationId xmlns:a16="http://schemas.microsoft.com/office/drawing/2014/main" id="{EC2E1A56-6DD0-E48E-D864-2167282DCDC8}"/>
-              </a:ext>
-            </a:extLst>
-          </p:cNvPr>
-          <p:cNvSpPr>
-            <a:spLocks noGrp="1"/>
-          </p:cNvSpPr>
-          <p:nvPr>
-            <p:ph type="sldNum" sz="quarter" idx="12"/>
-          </p:nvPr>
-        </p:nvSpPr>
-        <p:spPr>
-          <a:xfrm>
-            <a:off x="10926476" y="6356350"/>
-            <a:ext cx="625443" cy="365125"/>
-          </a:xfrm>
-          <a:noFill/>
-        </p:spPr>
-        <p:txBody>
-          <a:bodyPr vert="horz" lIns="91440" tIns="45720" rIns="91440" bIns="45720" rtlCol="0" anchor="ctr">
-            <a:normAutofit/>
-          </a:bodyPr>
-          <a:lstStyle/>
-          <a:p>
-            <a:pPr algn="l">
-              <a:spcAft>
-                <a:spcPts val="600"/>
-              </a:spcAft>
-            </a:pPr>
-            <a:fld id="{915BF9B4-2D6F-7943-B02D-01F59FFE0C5F}" type="slidenum">
-              <a:rPr lang="en-US" smtClean="0">
-                <a:solidFill>
-                  <a:schemeClr val="tx1">
-                    <a:tint val="75000"/>
-                  </a:schemeClr>
-                </a:solidFill>
-              </a:rPr>
-              <a:pPr algn="l">
-                <a:spcAft>
-                  <a:spcPts val="600"/>
-                </a:spcAft>
-              </a:pPr>
-              <a:t>7</a:t>
-            </a:fld>
-            <a:endParaRPr lang="en-US">
-              <a:solidFill>
-                <a:schemeClr val="tx1">
-                  <a:tint val="75000"/>
-                </a:schemeClr>
-              </a:solidFill>
-            </a:endParaRPr>
-          </a:p>
-        </p:txBody>
-      </p:sp>
-      <p:pic>
-        <p:nvPicPr>
-          <p:cNvPr id="4" name="Image 3" descr="Une image contenant texte, croquis, Parallèle, diagramme&#10;&#10;Description générée automatiquement">
-            <a:extLst>
-              <a:ext uri="{FF2B5EF4-FFF2-40B4-BE49-F238E27FC236}">
-                <a16:creationId xmlns:a16="http://schemas.microsoft.com/office/drawing/2014/main" id="{A90258FB-11D0-19A0-4E20-A80182B2B704}"/>
-              </a:ext>
-            </a:extLst>
-          </p:cNvPr>
-          <p:cNvPicPr>
-            <a:picLocks noChangeAspect="1"/>
-          </p:cNvPicPr>
-          <p:nvPr/>
-        </p:nvPicPr>
-        <p:blipFill>
-          <a:blip r:embed="rId2"/>
-          <a:stretch>
-            <a:fillRect/>
-          </a:stretch>
-        </p:blipFill>
-        <p:spPr>
-          <a:xfrm>
-            <a:off x="4182068" y="99030"/>
-            <a:ext cx="6269622" cy="6602791"/>
-          </a:xfrm>
-          <a:prstGeom prst="rect">
-            <a:avLst/>
-          </a:prstGeom>
-        </p:spPr>
-      </p:pic>
-    </p:spTree>
-    <p:extLst>
-      <p:ext uri="{BB962C8B-B14F-4D97-AF65-F5344CB8AC3E}">
-        <p14:creationId xmlns:p14="http://schemas.microsoft.com/office/powerpoint/2010/main" val="2265596792"/>
-      </p:ext>
-    </p:extLst>
-  </p:cSld>
-  <p:clrMapOvr>
-    <a:masterClrMapping/>
-  </p:clrMapOvr>
-</p:sld>
-</file>
-
-<file path=ppt/slides/slide8.xml><?xml version="1.0" encoding="utf-8"?>
 <p:sld xmlns:a="http://schemas.openxmlformats.org/drawingml/2006/main" xmlns:r="http://schemas.openxmlformats.org/officeDocument/2006/relationships" xmlns:p="http://schemas.openxmlformats.org/presentationml/2006/main">
   <p:cSld>
     <p:bg>
@@ -10017,7 +9793,7 @@
                   <a:spcPts val="600"/>
                 </a:spcAft>
               </a:pPr>
-              <a:t>8</a:t>
+              <a:t>7</a:t>
             </a:fld>
             <a:endParaRPr lang="en-US">
               <a:solidFill>

</xml_diff>

<commit_message>
Version finale du PowerPoint
</commit_message>
<xml_diff>
--- a/AVANT-PROJET/PrésentationAvantProjet.pptx
+++ b/AVANT-PROJET/PrésentationAvantProjet.pptx
@@ -936,7 +936,7 @@
         <a:p>
           <a:r>
             <a:rPr lang="fr-FR" dirty="0"/>
-            <a:t>II. Présentation du SWOT</a:t>
+            <a:t>II. Présentation du QUINTILIEN</a:t>
           </a:r>
           <a:endParaRPr lang="en-US" dirty="0"/>
         </a:p>
@@ -1010,7 +1010,7 @@
         <a:p>
           <a:r>
             <a:rPr lang="fr-FR" dirty="0"/>
-            <a:t>IV. Présentation du QUINTILIEN</a:t>
+            <a:t>IV. Présentation du SWOT</a:t>
           </a:r>
           <a:endParaRPr lang="en-US" dirty="0"/>
         </a:p>
@@ -1087,7 +1087,7 @@
       <dgm:spPr/>
     </dgm:pt>
     <dgm:pt modelId="{584D5366-2E09-DD4C-B3D9-D2FFBBB4D0C4}" type="pres">
-      <dgm:prSet presAssocID="{15C36091-1AB2-452F-8947-A1219372CAF1}" presName="parentText" presStyleLbl="node1" presStyleIdx="3" presStyleCnt="4">
+      <dgm:prSet presAssocID="{15C36091-1AB2-452F-8947-A1219372CAF1}" presName="parentText" presStyleLbl="node1" presStyleIdx="3" presStyleCnt="4" custLinFactNeighborX="-2705" custLinFactNeighborY="8819">
         <dgm:presLayoutVars>
           <dgm:chMax val="0"/>
           <dgm:bulletEnabled val="1"/>
@@ -1288,7 +1288,7 @@
           </a:pPr>
           <a:r>
             <a:rPr lang="fr-FR" sz="4000" kern="1200" dirty="0"/>
-            <a:t>II. Présentation du SWOT</a:t>
+            <a:t>II. Présentation du QUINTILIEN</a:t>
           </a:r>
           <a:endParaRPr lang="en-US" sz="4000" kern="1200" dirty="0"/>
         </a:p>
@@ -1384,7 +1384,7 @@
       </dsp:nvSpPr>
       <dsp:spPr>
         <a:xfrm>
-          <a:off x="0" y="3331269"/>
+          <a:off x="0" y="3341428"/>
           <a:ext cx="10515600" cy="982800"/>
         </a:xfrm>
         <a:prstGeom prst="roundRect">
@@ -1446,13 +1446,13 @@
           </a:pPr>
           <a:r>
             <a:rPr lang="fr-FR" sz="4000" kern="1200" dirty="0"/>
-            <a:t>IV. Présentation du QUINTILIEN</a:t>
+            <a:t>IV. Présentation du SWOT</a:t>
           </a:r>
           <a:endParaRPr lang="en-US" sz="4000" kern="1200" dirty="0"/>
         </a:p>
       </dsp:txBody>
       <dsp:txXfrm>
-        <a:off x="47976" y="3379245"/>
+        <a:off x="47976" y="3389404"/>
         <a:ext cx="10419648" cy="886848"/>
       </dsp:txXfrm>
     </dsp:sp>
@@ -6886,7 +6886,7 @@
             <p:ph idx="1"/>
             <p:extLst>
               <p:ext uri="{D42A27DB-BD31-4B8C-83A1-F6EECF244321}">
-                <p14:modId xmlns:p14="http://schemas.microsoft.com/office/powerpoint/2010/main" val="2948365228"/>
+                <p14:modId xmlns:p14="http://schemas.microsoft.com/office/powerpoint/2010/main" val="9393106"/>
               </p:ext>
             </p:extLst>
           </p:nvPr>

</xml_diff>